<commit_message>
Fixed MySQL table formatting and using jsonify in lecture
</commit_message>
<xml_diff>
--- a/Curriculum/Week_4/Lectures/4.3_Flask_Part_2.pptx
+++ b/Curriculum/Week_4/Lectures/4.3_Flask_Part_2.pptx
@@ -7393,19 +7393,127 @@
                 <a:cs typeface="Consolas"/>
                 <a:sym typeface="Consolas"/>
               </a:rPr>
-              <a:t>from flask import json, request		     </a:t>
-            </a:r>
-            <a:r>
-              <a:rPr lang="en" sz="1200" dirty="0">
-                <a:solidFill>
-                  <a:srgbClr val="999999"/>
+              <a:t>from flask import </a:t>
+            </a:r>
+            <a:r>
+              <a:rPr lang="en" sz="1200" dirty="0" smtClean="0">
+                <a:solidFill>
+                  <a:srgbClr val="000000"/>
                 </a:solidFill>
                 <a:latin typeface="Consolas"/>
                 <a:ea typeface="Consolas"/>
                 <a:cs typeface="Consolas"/>
                 <a:sym typeface="Consolas"/>
               </a:rPr>
-              <a:t># import the json and request libraries</a:t>
+              <a:t>json</a:t>
+            </a:r>
+            <a:r>
+              <a:rPr lang="en-US" sz="1200" dirty="0" err="1" smtClean="0">
+                <a:solidFill>
+                  <a:srgbClr val="000000"/>
+                </a:solidFill>
+                <a:latin typeface="Consolas"/>
+                <a:ea typeface="Consolas"/>
+                <a:cs typeface="Consolas"/>
+                <a:sym typeface="Consolas"/>
+              </a:rPr>
+              <a:t>ify</a:t>
+            </a:r>
+            <a:r>
+              <a:rPr lang="en" sz="1200" dirty="0" smtClean="0">
+                <a:solidFill>
+                  <a:srgbClr val="000000"/>
+                </a:solidFill>
+                <a:latin typeface="Consolas"/>
+                <a:ea typeface="Consolas"/>
+                <a:cs typeface="Consolas"/>
+                <a:sym typeface="Consolas"/>
+              </a:rPr>
+              <a:t>, </a:t>
+            </a:r>
+            <a:r>
+              <a:rPr lang="en" sz="1200" dirty="0">
+                <a:solidFill>
+                  <a:srgbClr val="000000"/>
+                </a:solidFill>
+                <a:latin typeface="Consolas"/>
+                <a:ea typeface="Consolas"/>
+                <a:cs typeface="Consolas"/>
+                <a:sym typeface="Consolas"/>
+              </a:rPr>
+              <a:t>request		</a:t>
+            </a:r>
+            <a:r>
+              <a:rPr lang="en" sz="1200" dirty="0" smtClean="0">
+                <a:solidFill>
+                  <a:srgbClr val="999999"/>
+                </a:solidFill>
+                <a:latin typeface="Consolas"/>
+                <a:ea typeface="Consolas"/>
+                <a:cs typeface="Consolas"/>
+                <a:sym typeface="Consolas"/>
+              </a:rPr>
+              <a:t># </a:t>
+            </a:r>
+            <a:r>
+              <a:rPr lang="en" sz="1200" dirty="0">
+                <a:solidFill>
+                  <a:srgbClr val="999999"/>
+                </a:solidFill>
+                <a:latin typeface="Consolas"/>
+                <a:ea typeface="Consolas"/>
+                <a:cs typeface="Consolas"/>
+                <a:sym typeface="Consolas"/>
+              </a:rPr>
+              <a:t>import the </a:t>
+            </a:r>
+            <a:r>
+              <a:rPr lang="en" sz="1200" dirty="0" smtClean="0">
+                <a:solidFill>
+                  <a:srgbClr val="999999"/>
+                </a:solidFill>
+                <a:latin typeface="Consolas"/>
+                <a:ea typeface="Consolas"/>
+                <a:cs typeface="Consolas"/>
+                <a:sym typeface="Consolas"/>
+              </a:rPr>
+              <a:t>json</a:t>
+            </a:r>
+            <a:r>
+              <a:rPr lang="en-US" sz="1200" dirty="0" err="1" smtClean="0">
+                <a:solidFill>
+                  <a:srgbClr val="999999"/>
+                </a:solidFill>
+                <a:latin typeface="Consolas"/>
+                <a:ea typeface="Consolas"/>
+                <a:cs typeface="Consolas"/>
+                <a:sym typeface="Consolas"/>
+              </a:rPr>
+              <a:t>ify</a:t>
+            </a:r>
+            <a:r>
+              <a:rPr lang="en" sz="1200" dirty="0" smtClean="0">
+                <a:solidFill>
+                  <a:srgbClr val="999999"/>
+                </a:solidFill>
+                <a:latin typeface="Consolas"/>
+                <a:ea typeface="Consolas"/>
+                <a:cs typeface="Consolas"/>
+                <a:sym typeface="Consolas"/>
+              </a:rPr>
+              <a:t> </a:t>
+            </a:r>
+            <a:r>
+              <a:rPr lang="en" sz="1200" dirty="0">
+                <a:solidFill>
+                  <a:srgbClr val="999999"/>
+                </a:solidFill>
+                <a:latin typeface="Consolas"/>
+                <a:ea typeface="Consolas"/>
+                <a:cs typeface="Consolas"/>
+                <a:sym typeface="Consolas"/>
+              </a:rPr>
+              <a:t>and request libraries</a:t>
             </a:r>
           </a:p>
           <a:p>
@@ -7556,10 +7664,10 @@
                 <a:cs typeface="Consolas"/>
                 <a:sym typeface="Consolas"/>
               </a:rPr>
-              <a:t> 				</a:t>
-            </a:r>
-            <a:r>
-              <a:rPr lang="en" sz="1200" dirty="0">
+              <a:t> 			</a:t>
+            </a:r>
+            <a:r>
+              <a:rPr lang="en" sz="1200" dirty="0" smtClean="0">
                 <a:solidFill>
                   <a:srgbClr val="999999"/>
                 </a:solidFill>
@@ -7568,43 +7676,216 @@
                 <a:cs typeface="Consolas"/>
                 <a:sym typeface="Consolas"/>
               </a:rPr>
-              <a:t># the form data is a dictionary</a:t>
-            </a:r>
-          </a:p>
-          <a:p>
-            <a:pPr marL="457200" lvl="0" indent="0" rtl="0">
-              <a:spcBef>
-                <a:spcPts val="0"/>
-              </a:spcBef>
-              <a:spcAft>
-                <a:spcPts val="0"/>
-              </a:spcAft>
-              <a:buNone/>
-            </a:pPr>
+              <a:t># </a:t>
+            </a:r>
             <a:r>
               <a:rPr lang="en" sz="1200" dirty="0">
                 <a:solidFill>
-                  <a:srgbClr val="000000"/>
+                  <a:srgbClr val="999999"/>
                 </a:solidFill>
                 <a:latin typeface="Consolas"/>
                 <a:ea typeface="Consolas"/>
                 <a:cs typeface="Consolas"/>
                 <a:sym typeface="Consolas"/>
               </a:rPr>
-              <a:t>return json.loads('{"message": "Added cow ' + name + '!"}') </a:t>
-            </a:r>
+              <a:t>the form data is a dictionary</a:t>
+            </a:r>
+          </a:p>
+          <a:p>
+            <a:pPr marL="457200" lvl="0">
+              <a:spcAft>
+                <a:spcPts val="0"/>
+              </a:spcAft>
+            </a:pPr>
             <a:r>
               <a:rPr lang="en" sz="1200" dirty="0">
                 <a:solidFill>
-                  <a:srgbClr val="999999"/>
+                  <a:srgbClr val="000000"/>
                 </a:solidFill>
                 <a:latin typeface="Consolas"/>
                 <a:ea typeface="Consolas"/>
                 <a:cs typeface="Consolas"/>
                 <a:sym typeface="Consolas"/>
               </a:rPr>
-              <a:t># convert string to json</a:t>
-            </a:r>
+              <a:t>return </a:t>
+            </a:r>
+            <a:r>
+              <a:rPr lang="en" sz="1200" dirty="0" smtClean="0">
+                <a:solidFill>
+                  <a:srgbClr val="000000"/>
+                </a:solidFill>
+                <a:latin typeface="Consolas"/>
+                <a:ea typeface="Consolas"/>
+                <a:cs typeface="Consolas"/>
+                <a:sym typeface="Consolas"/>
+              </a:rPr>
+              <a:t>json</a:t>
+            </a:r>
+            <a:r>
+              <a:rPr lang="en-US" sz="1200" dirty="0" err="1" smtClean="0">
+                <a:solidFill>
+                  <a:srgbClr val="000000"/>
+                </a:solidFill>
+                <a:latin typeface="Consolas"/>
+                <a:ea typeface="Consolas"/>
+                <a:cs typeface="Consolas"/>
+                <a:sym typeface="Consolas"/>
+              </a:rPr>
+              <a:t>ify</a:t>
+            </a:r>
+            <a:r>
+              <a:rPr lang="en" sz="1200" dirty="0" smtClean="0">
+                <a:solidFill>
+                  <a:srgbClr val="000000"/>
+                </a:solidFill>
+                <a:latin typeface="Consolas"/>
+                <a:ea typeface="Consolas"/>
+                <a:cs typeface="Consolas"/>
+                <a:sym typeface="Consolas"/>
+              </a:rPr>
+              <a:t>({"</a:t>
+            </a:r>
+            <a:r>
+              <a:rPr lang="en" sz="1200" dirty="0">
+                <a:solidFill>
+                  <a:srgbClr val="000000"/>
+                </a:solidFill>
+                <a:latin typeface="Consolas"/>
+                <a:ea typeface="Consolas"/>
+                <a:cs typeface="Consolas"/>
+                <a:sym typeface="Consolas"/>
+              </a:rPr>
+              <a:t>message": "Added cow </a:t>
+            </a:r>
+            <a:r>
+              <a:rPr lang="en" sz="1200" dirty="0">
+                <a:solidFill>
+                  <a:srgbClr val="000000"/>
+                </a:solidFill>
+                <a:latin typeface="Consolas"/>
+                <a:ea typeface="Consolas"/>
+                <a:cs typeface="Consolas"/>
+                <a:sym typeface="Consolas"/>
+              </a:rPr>
+              <a:t>" </a:t>
+            </a:r>
+            <a:r>
+              <a:rPr lang="en" sz="1200" dirty="0">
+                <a:solidFill>
+                  <a:srgbClr val="000000"/>
+                </a:solidFill>
+                <a:latin typeface="Consolas"/>
+                <a:ea typeface="Consolas"/>
+                <a:cs typeface="Consolas"/>
+                <a:sym typeface="Consolas"/>
+              </a:rPr>
+              <a:t>+ name </a:t>
+            </a:r>
+            <a:r>
+              <a:rPr lang="en" sz="1200" dirty="0" smtClean="0">
+                <a:solidFill>
+                  <a:srgbClr val="000000"/>
+                </a:solidFill>
+                <a:latin typeface="Consolas"/>
+                <a:ea typeface="Consolas"/>
+                <a:cs typeface="Consolas"/>
+                <a:sym typeface="Consolas"/>
+              </a:rPr>
+              <a:t>+</a:t>
+            </a:r>
+            <a:r>
+              <a:rPr lang="en-US" sz="1200" dirty="0" smtClean="0">
+                <a:solidFill>
+                  <a:srgbClr val="000000"/>
+                </a:solidFill>
+                <a:latin typeface="Consolas"/>
+                <a:ea typeface="Consolas"/>
+                <a:cs typeface="Consolas"/>
+                <a:sym typeface="Consolas"/>
+              </a:rPr>
+              <a:t> </a:t>
+            </a:r>
+            <a:r>
+              <a:rPr lang="en" sz="1200" dirty="0" smtClean="0">
+                <a:solidFill>
+                  <a:srgbClr val="000000"/>
+                </a:solidFill>
+                <a:latin typeface="Consolas"/>
+                <a:ea typeface="Consolas"/>
+                <a:cs typeface="Consolas"/>
+                <a:sym typeface="Consolas"/>
+              </a:rPr>
+              <a:t>"!"})</a:t>
+            </a:r>
+            <a:r>
+              <a:rPr lang="en-US" sz="1200" dirty="0" smtClean="0">
+                <a:solidFill>
+                  <a:srgbClr val="000000"/>
+                </a:solidFill>
+                <a:latin typeface="Consolas"/>
+                <a:ea typeface="Consolas"/>
+                <a:cs typeface="Consolas"/>
+                <a:sym typeface="Consolas"/>
+              </a:rPr>
+              <a:t>, 200</a:t>
+            </a:r>
+            <a:r>
+              <a:rPr lang="en" sz="1200" dirty="0" smtClean="0">
+                <a:solidFill>
+                  <a:srgbClr val="000000"/>
+                </a:solidFill>
+                <a:latin typeface="Consolas"/>
+                <a:ea typeface="Consolas"/>
+                <a:cs typeface="Consolas"/>
+                <a:sym typeface="Consolas"/>
+              </a:rPr>
+              <a:t> </a:t>
+            </a:r>
+            <a:r>
+              <a:rPr lang="en" sz="1200" dirty="0">
+                <a:solidFill>
+                  <a:srgbClr val="999999"/>
+                </a:solidFill>
+                <a:latin typeface="Consolas"/>
+                <a:ea typeface="Consolas"/>
+                <a:cs typeface="Consolas"/>
+                <a:sym typeface="Consolas"/>
+              </a:rPr>
+              <a:t># </a:t>
+            </a:r>
+            <a:r>
+              <a:rPr lang="en-US" sz="1200" dirty="0" smtClean="0">
+                <a:solidFill>
+                  <a:srgbClr val="999999"/>
+                </a:solidFill>
+                <a:latin typeface="Consolas"/>
+                <a:ea typeface="Consolas"/>
+                <a:cs typeface="Consolas"/>
+                <a:sym typeface="Consolas"/>
+              </a:rPr>
+              <a:t>return a Flask </a:t>
+            </a:r>
+            <a:r>
+              <a:rPr lang="en-US" sz="1200" dirty="0" smtClean="0">
+                <a:solidFill>
+                  <a:srgbClr val="999999"/>
+                </a:solidFill>
+                <a:latin typeface="Consolas"/>
+                <a:ea typeface="Consolas"/>
+                <a:cs typeface="Consolas"/>
+                <a:sym typeface="Consolas"/>
+              </a:rPr>
+              <a:t>Response object</a:t>
+            </a:r>
+            <a:endParaRPr lang="en" sz="1200" dirty="0">
+              <a:solidFill>
+                <a:srgbClr val="999999"/>
+              </a:solidFill>
+              <a:latin typeface="Consolas"/>
+              <a:ea typeface="Consolas"/>
+              <a:cs typeface="Consolas"/>
+              <a:sym typeface="Consolas"/>
+            </a:endParaRPr>
           </a:p>
           <a:p>
             <a:pPr lvl="0">

</xml_diff>